<commit_message>
Cully implemented, but current bug is that the lines are drawing straight across at y=150ish
</commit_message>
<xml_diff>
--- a/Lab02_Block_Diagrams.pptx
+++ b/Lab02_Block_Diagrams.pptx
@@ -212,7 +212,7 @@
           <a:p>
             <a:fld id="{8F2FD15C-CBA0-4BCE-BE84-26287205EF6C}" type="datetimeFigureOut">
               <a:rPr lang="en-US" smtClean="0"/>
-              <a:t>2025-04-29</a:t>
+              <a:t>2025-04-30</a:t>
             </a:fld>
             <a:endParaRPr lang="en-US"/>
           </a:p>
@@ -1043,7 +1043,7 @@
             <a:fld id="{1D8BD707-D9CF-40AE-B4C6-C98DA3205C09}" type="datetimeFigureOut">
               <a:rPr lang="en-US" smtClean="0"/>
               <a:pPr/>
-              <a:t>2025-04-29</a:t>
+              <a:t>2025-04-30</a:t>
             </a:fld>
             <a:endParaRPr lang="en-US"/>
           </a:p>
@@ -1208,7 +1208,7 @@
             <a:fld id="{1D8BD707-D9CF-40AE-B4C6-C98DA3205C09}" type="datetimeFigureOut">
               <a:rPr lang="en-US" smtClean="0"/>
               <a:pPr/>
-              <a:t>2025-04-29</a:t>
+              <a:t>2025-04-30</a:t>
             </a:fld>
             <a:endParaRPr lang="en-US"/>
           </a:p>
@@ -1383,7 +1383,7 @@
             <a:fld id="{1D8BD707-D9CF-40AE-B4C6-C98DA3205C09}" type="datetimeFigureOut">
               <a:rPr lang="en-US" smtClean="0"/>
               <a:pPr/>
-              <a:t>2025-04-29</a:t>
+              <a:t>2025-04-30</a:t>
             </a:fld>
             <a:endParaRPr lang="en-US"/>
           </a:p>
@@ -1548,7 +1548,7 @@
             <a:fld id="{1D8BD707-D9CF-40AE-B4C6-C98DA3205C09}" type="datetimeFigureOut">
               <a:rPr lang="en-US" smtClean="0"/>
               <a:pPr/>
-              <a:t>2025-04-29</a:t>
+              <a:t>2025-04-30</a:t>
             </a:fld>
             <a:endParaRPr lang="en-US"/>
           </a:p>
@@ -1790,7 +1790,7 @@
             <a:fld id="{1D8BD707-D9CF-40AE-B4C6-C98DA3205C09}" type="datetimeFigureOut">
               <a:rPr lang="en-US" smtClean="0"/>
               <a:pPr/>
-              <a:t>2025-04-29</a:t>
+              <a:t>2025-04-30</a:t>
             </a:fld>
             <a:endParaRPr lang="en-US"/>
           </a:p>
@@ -2072,7 +2072,7 @@
             <a:fld id="{1D8BD707-D9CF-40AE-B4C6-C98DA3205C09}" type="datetimeFigureOut">
               <a:rPr lang="en-US" smtClean="0"/>
               <a:pPr/>
-              <a:t>2025-04-29</a:t>
+              <a:t>2025-04-30</a:t>
             </a:fld>
             <a:endParaRPr lang="en-US"/>
           </a:p>
@@ -2488,7 +2488,7 @@
             <a:fld id="{1D8BD707-D9CF-40AE-B4C6-C98DA3205C09}" type="datetimeFigureOut">
               <a:rPr lang="en-US" smtClean="0"/>
               <a:pPr/>
-              <a:t>2025-04-29</a:t>
+              <a:t>2025-04-30</a:t>
             </a:fld>
             <a:endParaRPr lang="en-US"/>
           </a:p>
@@ -2602,7 +2602,7 @@
             <a:fld id="{1D8BD707-D9CF-40AE-B4C6-C98DA3205C09}" type="datetimeFigureOut">
               <a:rPr lang="en-US" smtClean="0"/>
               <a:pPr/>
-              <a:t>2025-04-29</a:t>
+              <a:t>2025-04-30</a:t>
             </a:fld>
             <a:endParaRPr lang="en-US"/>
           </a:p>
@@ -2694,7 +2694,7 @@
             <a:fld id="{1D8BD707-D9CF-40AE-B4C6-C98DA3205C09}" type="datetimeFigureOut">
               <a:rPr lang="en-US" smtClean="0"/>
               <a:pPr/>
-              <a:t>2025-04-29</a:t>
+              <a:t>2025-04-30</a:t>
             </a:fld>
             <a:endParaRPr lang="en-US"/>
           </a:p>
@@ -2966,7 +2966,7 @@
             <a:fld id="{1D8BD707-D9CF-40AE-B4C6-C98DA3205C09}" type="datetimeFigureOut">
               <a:rPr lang="en-US" smtClean="0"/>
               <a:pPr/>
-              <a:t>2025-04-29</a:t>
+              <a:t>2025-04-30</a:t>
             </a:fld>
             <a:endParaRPr lang="en-US"/>
           </a:p>
@@ -3215,7 +3215,7 @@
             <a:fld id="{1D8BD707-D9CF-40AE-B4C6-C98DA3205C09}" type="datetimeFigureOut">
               <a:rPr lang="en-US" smtClean="0"/>
               <a:pPr/>
-              <a:t>2025-04-29</a:t>
+              <a:t>2025-04-30</a:t>
             </a:fld>
             <a:endParaRPr lang="en-US"/>
           </a:p>
@@ -3423,7 +3423,7 @@
             <a:fld id="{1D8BD707-D9CF-40AE-B4C6-C98DA3205C09}" type="datetimeFigureOut">
               <a:rPr lang="en-US" smtClean="0"/>
               <a:pPr/>
-              <a:t>2025-04-29</a:t>
+              <a:t>2025-04-30</a:t>
             </a:fld>
             <a:endParaRPr lang="en-US"/>
           </a:p>
@@ -17152,7 +17152,7 @@
         <p:spPr>
           <a:xfrm>
             <a:off x="4974056" y="4486552"/>
-            <a:ext cx="533400" cy="369332"/>
+            <a:ext cx="817144" cy="369332"/>
           </a:xfrm>
           <a:prstGeom prst="rect">
             <a:avLst/>
@@ -17169,7 +17169,10 @@
               <a:rPr lang="en-US" sz="1800" dirty="0" err="1"/>
               <a:t>sw</a:t>
             </a:r>
-            <a:endParaRPr lang="en-US" sz="1800" dirty="0"/>
+            <a:r>
+              <a:rPr lang="en-US" sz="1800" dirty="0"/>
+              <a:t>(1)</a:t>
+            </a:r>
           </a:p>
         </p:txBody>
       </p:sp>
@@ -19050,6 +19053,7 @@
         <p:nvCxnSpPr>
           <p:cNvPr id="279" name="Straight Connector 278"/>
           <p:cNvCxnSpPr>
+            <a:cxnSpLocks/>
             <a:stCxn id="280" idx="3"/>
             <a:endCxn id="283" idx="1"/>
           </p:cNvCxnSpPr>
@@ -19093,8 +19097,8 @@
         </p:nvSpPr>
         <p:spPr>
           <a:xfrm>
-            <a:off x="4625165" y="2053114"/>
-            <a:ext cx="759542" cy="369332"/>
+            <a:off x="4312884" y="2053114"/>
+            <a:ext cx="1071823" cy="369332"/>
           </a:xfrm>
           <a:prstGeom prst="rect">
             <a:avLst/>
@@ -19112,7 +19116,10 @@
               <a:rPr lang="en-US" sz="1800" dirty="0" err="1"/>
               <a:t>cw</a:t>
             </a:r>
-            <a:endParaRPr lang="en-US" sz="1800" dirty="0"/>
+            <a:r>
+              <a:rPr lang="en-US" sz="1800" dirty="0"/>
+              <a:t>(1..0)</a:t>
+            </a:r>
           </a:p>
         </p:txBody>
       </p:sp>
@@ -20550,6 +20557,7 @@
         <p:nvCxnSpPr>
           <p:cNvPr id="384" name="Straight Connector 383"/>
           <p:cNvCxnSpPr>
+            <a:cxnSpLocks/>
             <a:stCxn id="351" idx="3"/>
             <a:endCxn id="385" idx="1"/>
           </p:cNvCxnSpPr>
@@ -20558,7 +20566,7 @@
         <p:spPr>
           <a:xfrm flipV="1">
             <a:off x="8547981" y="8247397"/>
-            <a:ext cx="369505" cy="1010"/>
+            <a:ext cx="369504" cy="1010"/>
           </a:xfrm>
           <a:prstGeom prst="line">
             <a:avLst/>
@@ -20593,8 +20601,8 @@
         </p:nvSpPr>
         <p:spPr>
           <a:xfrm>
-            <a:off x="8917486" y="8062731"/>
-            <a:ext cx="455114" cy="369332"/>
+            <a:off x="8917485" y="8062731"/>
+            <a:ext cx="962891" cy="369332"/>
           </a:xfrm>
           <a:prstGeom prst="rect">
             <a:avLst/>
@@ -20611,7 +20619,10 @@
               <a:rPr lang="en-US" sz="1800" dirty="0" err="1"/>
               <a:t>sw</a:t>
             </a:r>
-            <a:endParaRPr lang="en-US" sz="1800" dirty="0"/>
+            <a:r>
+              <a:rPr lang="en-US" sz="1800" dirty="0"/>
+              <a:t>(2)</a:t>
+            </a:r>
           </a:p>
         </p:txBody>
       </p:sp>
@@ -20979,8 +20990,8 @@
         </p:nvSpPr>
         <p:spPr>
           <a:xfrm>
-            <a:off x="5334000" y="7551182"/>
-            <a:ext cx="795260" cy="369332"/>
+            <a:off x="4222030" y="6096000"/>
+            <a:ext cx="1416659" cy="369332"/>
           </a:xfrm>
           <a:prstGeom prst="rect">
             <a:avLst/>
@@ -20995,9 +21006,10 @@
           <a:p>
             <a:pPr algn="ctr"/>
             <a:r>
-              <a:rPr lang="en-US" sz="1800" dirty="0"/>
-              <a:t>D</a:t>
-            </a:r>
+              <a:rPr lang="en-US" sz="1800" dirty="0" err="1"/>
+              <a:t>curr_sample</a:t>
+            </a:r>
+            <a:endParaRPr lang="en-US" sz="1800" dirty="0"/>
           </a:p>
         </p:txBody>
       </p:sp>
@@ -21009,8 +21021,8 @@
         </p:nvSpPr>
         <p:spPr>
           <a:xfrm>
-            <a:off x="5348514" y="8544628"/>
-            <a:ext cx="795260" cy="369332"/>
+            <a:off x="4112075" y="8545910"/>
+            <a:ext cx="1426453" cy="369332"/>
           </a:xfrm>
           <a:prstGeom prst="rect">
             <a:avLst/>
@@ -21025,9 +21037,10 @@
           <a:p>
             <a:pPr algn="ctr"/>
             <a:r>
-              <a:rPr lang="en-US" sz="1800" dirty="0"/>
-              <a:t>Q</a:t>
-            </a:r>
+              <a:rPr lang="en-US" sz="1800" dirty="0" err="1"/>
+              <a:t>prev_sample</a:t>
+            </a:r>
+            <a:endParaRPr lang="en-US" sz="1800" dirty="0"/>
           </a:p>
         </p:txBody>
       </p:sp>
@@ -23156,7 +23169,10 @@
               <a:rPr lang="en-US" sz="1800" dirty="0" err="1"/>
               <a:t>cw</a:t>
             </a:r>
-            <a:endParaRPr lang="en-US" sz="1800" dirty="0"/>
+            <a:r>
+              <a:rPr lang="en-US" sz="1800" dirty="0"/>
+              <a:t>(2)</a:t>
+            </a:r>
           </a:p>
         </p:txBody>
       </p:sp>
@@ -23983,8 +23999,8 @@
         </p:nvSpPr>
         <p:spPr>
           <a:xfrm>
-            <a:off x="6543228" y="3207782"/>
-            <a:ext cx="455114" cy="369332"/>
+            <a:off x="6501685" y="3556516"/>
+            <a:ext cx="792393" cy="369332"/>
           </a:xfrm>
           <a:prstGeom prst="rect">
             <a:avLst/>
@@ -24001,7 +24017,10 @@
               <a:rPr lang="en-US" sz="1800" dirty="0" err="1"/>
               <a:t>sw</a:t>
             </a:r>
-            <a:endParaRPr lang="en-US" sz="1800" dirty="0"/>
+            <a:r>
+              <a:rPr lang="en-US" sz="1800" dirty="0"/>
+              <a:t>(0)</a:t>
+            </a:r>
           </a:p>
         </p:txBody>
       </p:sp>
@@ -25858,6 +25877,43 @@
               <a:rPr lang="en-US" sz="2400" b="1" dirty="0"/>
               <a:t>Anti-Scroll Text Box</a:t>
             </a:r>
+          </a:p>
+        </p:txBody>
+      </p:sp>
+      <p:sp>
+        <p:nvSpPr>
+          <p:cNvPr id="3" name="TextBox 2">
+            <a:extLst>
+              <a:ext uri="{FF2B5EF4-FFF2-40B4-BE49-F238E27FC236}">
+                <a16:creationId xmlns:a16="http://schemas.microsoft.com/office/drawing/2014/main" id="{18FE730B-2CD3-F1EF-BE8A-1CFDF6BD48FE}"/>
+              </a:ext>
+            </a:extLst>
+          </p:cNvPr>
+          <p:cNvSpPr txBox="1"/>
+          <p:nvPr/>
+        </p:nvSpPr>
+        <p:spPr>
+          <a:xfrm>
+            <a:off x="9437568" y="3856362"/>
+            <a:ext cx="885618" cy="369332"/>
+          </a:xfrm>
+          <a:prstGeom prst="rect">
+            <a:avLst/>
+          </a:prstGeom>
+          <a:noFill/>
+        </p:spPr>
+        <p:txBody>
+          <a:bodyPr wrap="square" lIns="91440" tIns="45720" rIns="91440" bIns="45720" rtlCol="0">
+            <a:spAutoFit/>
+          </a:bodyPr>
+          <a:lstStyle/>
+          <a:p>
+            <a:pPr algn="ctr"/>
+            <a:r>
+              <a:rPr lang="en-US" sz="1800" dirty="0" err="1"/>
+              <a:t>wrAddr</a:t>
+            </a:r>
+            <a:endParaRPr lang="en-US" sz="1800" dirty="0"/>
           </a:p>
         </p:txBody>
       </p:sp>

</xml_diff>